<commit_message>
Final draft of presentation. Ready for final check and submission
</commit_message>
<xml_diff>
--- a/Presentation for Holmusk.pptx
+++ b/Presentation for Holmusk.pptx
@@ -11,7 +11,14 @@
     <p:sldId id="262" r:id="rId5"/>
     <p:sldId id="259" r:id="rId6"/>
     <p:sldId id="261" r:id="rId7"/>
-    <p:sldId id="264" r:id="rId8"/>
+    <p:sldId id="265" r:id="rId8"/>
+    <p:sldId id="267" r:id="rId9"/>
+    <p:sldId id="268" r:id="rId10"/>
+    <p:sldId id="269" r:id="rId11"/>
+    <p:sldId id="271" r:id="rId12"/>
+    <p:sldId id="272" r:id="rId13"/>
+    <p:sldId id="273" r:id="rId14"/>
+    <p:sldId id="274" r:id="rId15"/>
   </p:sldIdLst>
   <p:sldSz cx="12192000" cy="6858000"/>
   <p:notesSz cx="6858000" cy="9144000"/>
@@ -110,7 +117,936 @@
       </a:defRPr>
     </a:lvl9pPr>
   </p:defaultTextStyle>
+  <p:extLst>
+    <p:ext uri="{EFAFB233-063F-42B5-8137-9DF3F51BA10A}">
+      <p15:sldGuideLst xmlns:p15="http://schemas.microsoft.com/office/powerpoint/2012/main"/>
+    </p:ext>
+  </p:extLst>
 </p:presentation>
+</file>
+
+<file path=ppt/charts/chart1.xml><?xml version="1.0" encoding="utf-8"?>
+<c:chartSpace xmlns:c="http://schemas.openxmlformats.org/drawingml/2006/chart" xmlns:a="http://schemas.openxmlformats.org/drawingml/2006/main" xmlns:r="http://schemas.openxmlformats.org/officeDocument/2006/relationships" xmlns:c16r2="http://schemas.microsoft.com/office/drawing/2015/06/chart">
+  <c:date1904 val="0"/>
+  <c:lang val="en-US"/>
+  <c:roundedCorners val="0"/>
+  <mc:AlternateContent xmlns:mc="http://schemas.openxmlformats.org/markup-compatibility/2006">
+    <mc:Choice xmlns:c14="http://schemas.microsoft.com/office/drawing/2007/8/2/chart" Requires="c14">
+      <c14:style val="102"/>
+    </mc:Choice>
+    <mc:Fallback>
+      <c:style val="2"/>
+    </mc:Fallback>
+  </mc:AlternateContent>
+  <c:chart>
+    <c:title>
+      <c:tx>
+        <c:rich>
+          <a:bodyPr rot="0" spcFirstLastPara="1" vertOverflow="ellipsis" vert="horz" wrap="square" anchor="ctr" anchorCtr="1"/>
+          <a:lstStyle/>
+          <a:p>
+            <a:pPr>
+              <a:defRPr sz="1400" b="0" i="0" u="none" strike="noStrike" kern="1200" spc="0" baseline="0">
+                <a:solidFill>
+                  <a:schemeClr val="tx1">
+                    <a:lumMod val="65000"/>
+                    <a:lumOff val="35000"/>
+                  </a:schemeClr>
+                </a:solidFill>
+                <a:latin typeface="+mn-lt"/>
+                <a:ea typeface="+mn-ea"/>
+                <a:cs typeface="+mn-cs"/>
+              </a:defRPr>
+            </a:pPr>
+            <a:r>
+              <a:rPr lang="en-US" dirty="0"/>
+              <a:t>Race Distribution</a:t>
+            </a:r>
+          </a:p>
+        </c:rich>
+      </c:tx>
+      <c:overlay val="0"/>
+      <c:spPr>
+        <a:noFill/>
+        <a:ln>
+          <a:noFill/>
+        </a:ln>
+        <a:effectLst/>
+      </c:spPr>
+      <c:txPr>
+        <a:bodyPr rot="0" spcFirstLastPara="1" vertOverflow="ellipsis" vert="horz" wrap="square" anchor="ctr" anchorCtr="1"/>
+        <a:lstStyle/>
+        <a:p>
+          <a:pPr>
+            <a:defRPr sz="1400" b="0" i="0" u="none" strike="noStrike" kern="1200" spc="0" baseline="0">
+              <a:solidFill>
+                <a:schemeClr val="tx1">
+                  <a:lumMod val="65000"/>
+                  <a:lumOff val="35000"/>
+                </a:schemeClr>
+              </a:solidFill>
+              <a:latin typeface="+mn-lt"/>
+              <a:ea typeface="+mn-ea"/>
+              <a:cs typeface="+mn-cs"/>
+            </a:defRPr>
+          </a:pPr>
+          <a:endParaRPr lang="en-US"/>
+        </a:p>
+      </c:txPr>
+    </c:title>
+    <c:autoTitleDeleted val="0"/>
+    <c:plotArea>
+      <c:layout/>
+      <c:pieChart>
+        <c:varyColors val="1"/>
+        <c:ser>
+          <c:idx val="0"/>
+          <c:order val="0"/>
+          <c:dPt>
+            <c:idx val="0"/>
+            <c:bubble3D val="0"/>
+            <c:spPr>
+              <a:solidFill>
+                <a:schemeClr val="accent1"/>
+              </a:solidFill>
+              <a:ln w="19050">
+                <a:solidFill>
+                  <a:schemeClr val="lt1"/>
+                </a:solidFill>
+              </a:ln>
+              <a:effectLst/>
+            </c:spPr>
+            <c:extLst>
+              <c:ext xmlns:c16="http://schemas.microsoft.com/office/drawing/2014/chart" uri="{C3380CC4-5D6E-409C-BE32-E72D297353CC}">
+                <c16:uniqueId val="{00000001-9C74-40DD-9394-EC2771CB5635}"/>
+              </c:ext>
+            </c:extLst>
+          </c:dPt>
+          <c:dPt>
+            <c:idx val="1"/>
+            <c:bubble3D val="0"/>
+            <c:spPr>
+              <a:solidFill>
+                <a:schemeClr val="accent2"/>
+              </a:solidFill>
+              <a:ln w="19050">
+                <a:solidFill>
+                  <a:schemeClr val="lt1"/>
+                </a:solidFill>
+              </a:ln>
+              <a:effectLst/>
+            </c:spPr>
+            <c:extLst>
+              <c:ext xmlns:c16="http://schemas.microsoft.com/office/drawing/2014/chart" uri="{C3380CC4-5D6E-409C-BE32-E72D297353CC}">
+                <c16:uniqueId val="{00000003-9C74-40DD-9394-EC2771CB5635}"/>
+              </c:ext>
+            </c:extLst>
+          </c:dPt>
+          <c:dPt>
+            <c:idx val="2"/>
+            <c:bubble3D val="0"/>
+            <c:spPr>
+              <a:solidFill>
+                <a:schemeClr val="accent3"/>
+              </a:solidFill>
+              <a:ln w="19050">
+                <a:solidFill>
+                  <a:schemeClr val="lt1"/>
+                </a:solidFill>
+              </a:ln>
+              <a:effectLst/>
+            </c:spPr>
+            <c:extLst>
+              <c:ext xmlns:c16="http://schemas.microsoft.com/office/drawing/2014/chart" uri="{C3380CC4-5D6E-409C-BE32-E72D297353CC}">
+                <c16:uniqueId val="{00000005-9C74-40DD-9394-EC2771CB5635}"/>
+              </c:ext>
+            </c:extLst>
+          </c:dPt>
+          <c:dPt>
+            <c:idx val="3"/>
+            <c:bubble3D val="0"/>
+            <c:spPr>
+              <a:solidFill>
+                <a:schemeClr val="accent4"/>
+              </a:solidFill>
+              <a:ln w="19050">
+                <a:solidFill>
+                  <a:schemeClr val="lt1"/>
+                </a:solidFill>
+              </a:ln>
+              <a:effectLst/>
+            </c:spPr>
+            <c:extLst>
+              <c:ext xmlns:c16="http://schemas.microsoft.com/office/drawing/2014/chart" uri="{C3380CC4-5D6E-409C-BE32-E72D297353CC}">
+                <c16:uniqueId val="{00000007-9C74-40DD-9394-EC2771CB5635}"/>
+              </c:ext>
+            </c:extLst>
+          </c:dPt>
+          <c:dPt>
+            <c:idx val="4"/>
+            <c:bubble3D val="0"/>
+            <c:spPr>
+              <a:solidFill>
+                <a:schemeClr val="accent5"/>
+              </a:solidFill>
+              <a:ln w="19050">
+                <a:solidFill>
+                  <a:schemeClr val="lt1"/>
+                </a:solidFill>
+              </a:ln>
+              <a:effectLst/>
+            </c:spPr>
+            <c:extLst>
+              <c:ext xmlns:c16="http://schemas.microsoft.com/office/drawing/2014/chart" uri="{C3380CC4-5D6E-409C-BE32-E72D297353CC}">
+                <c16:uniqueId val="{00000009-9C74-40DD-9394-EC2771CB5635}"/>
+              </c:ext>
+            </c:extLst>
+          </c:dPt>
+          <c:dLbls>
+            <c:spPr>
+              <a:noFill/>
+              <a:ln>
+                <a:noFill/>
+              </a:ln>
+              <a:effectLst/>
+            </c:spPr>
+            <c:txPr>
+              <a:bodyPr rot="0" spcFirstLastPara="1" vertOverflow="ellipsis" vert="horz" wrap="square" lIns="38100" tIns="19050" rIns="38100" bIns="19050" anchor="ctr" anchorCtr="1">
+                <a:spAutoFit/>
+              </a:bodyPr>
+              <a:lstStyle/>
+              <a:p>
+                <a:pPr>
+                  <a:defRPr sz="900" b="0" i="0" u="none" strike="noStrike" kern="1200" baseline="0">
+                    <a:solidFill>
+                      <a:schemeClr val="tx1">
+                        <a:lumMod val="75000"/>
+                        <a:lumOff val="25000"/>
+                      </a:schemeClr>
+                    </a:solidFill>
+                    <a:latin typeface="+mn-lt"/>
+                    <a:ea typeface="+mn-ea"/>
+                    <a:cs typeface="+mn-cs"/>
+                  </a:defRPr>
+                </a:pPr>
+                <a:endParaRPr lang="en-US"/>
+              </a:p>
+            </c:txPr>
+            <c:dLblPos val="bestFit"/>
+            <c:showLegendKey val="0"/>
+            <c:showVal val="1"/>
+            <c:showCatName val="0"/>
+            <c:showSerName val="0"/>
+            <c:showPercent val="0"/>
+            <c:showBubbleSize val="0"/>
+            <c:showLeaderLines val="1"/>
+            <c:leaderLines>
+              <c:spPr>
+                <a:ln w="9525" cap="flat" cmpd="sng" algn="ctr">
+                  <a:solidFill>
+                    <a:schemeClr val="tx1">
+                      <a:lumMod val="35000"/>
+                      <a:lumOff val="65000"/>
+                    </a:schemeClr>
+                  </a:solidFill>
+                  <a:round/>
+                </a:ln>
+                <a:effectLst/>
+              </c:spPr>
+            </c:leaderLines>
+            <c:extLst>
+              <c:ext xmlns:c15="http://schemas.microsoft.com/office/drawing/2012/chart" uri="{CE6537A1-D6FC-4f65-9D91-7224C49458BB}"/>
+            </c:extLst>
+          </c:dLbls>
+          <c:cat>
+            <c:strRef>
+              <c:f>Sheet1!$A$1:$A$5</c:f>
+              <c:strCache>
+                <c:ptCount val="4"/>
+                <c:pt idx="0">
+                  <c:v>Chinese</c:v>
+                </c:pt>
+                <c:pt idx="1">
+                  <c:v>Indian</c:v>
+                </c:pt>
+                <c:pt idx="2">
+                  <c:v>Malay</c:v>
+                </c:pt>
+                <c:pt idx="3">
+                  <c:v>Others</c:v>
+                </c:pt>
+              </c:strCache>
+            </c:strRef>
+          </c:cat>
+          <c:val>
+            <c:numRef>
+              <c:f>Sheet1!$C$1:$C$5</c:f>
+              <c:numCache>
+                <c:formatCode>0%</c:formatCode>
+                <c:ptCount val="5"/>
+                <c:pt idx="0">
+                  <c:v>0.64009661835748788</c:v>
+                </c:pt>
+                <c:pt idx="1">
+                  <c:v>0.10179434092477571</c:v>
+                </c:pt>
+                <c:pt idx="2">
+                  <c:v>0.20634920634920634</c:v>
+                </c:pt>
+                <c:pt idx="3">
+                  <c:v>5.1759834368530024E-2</c:v>
+                </c:pt>
+              </c:numCache>
+            </c:numRef>
+          </c:val>
+          <c:extLst>
+            <c:ext xmlns:c16="http://schemas.microsoft.com/office/drawing/2014/chart" uri="{C3380CC4-5D6E-409C-BE32-E72D297353CC}">
+              <c16:uniqueId val="{0000000A-9C74-40DD-9394-EC2771CB5635}"/>
+            </c:ext>
+          </c:extLst>
+        </c:ser>
+        <c:dLbls>
+          <c:dLblPos val="bestFit"/>
+          <c:showLegendKey val="0"/>
+          <c:showVal val="1"/>
+          <c:showCatName val="0"/>
+          <c:showSerName val="0"/>
+          <c:showPercent val="0"/>
+          <c:showBubbleSize val="0"/>
+          <c:showLeaderLines val="1"/>
+        </c:dLbls>
+        <c:firstSliceAng val="0"/>
+      </c:pieChart>
+      <c:spPr>
+        <a:noFill/>
+        <a:ln>
+          <a:noFill/>
+        </a:ln>
+        <a:effectLst/>
+      </c:spPr>
+    </c:plotArea>
+    <c:legend>
+      <c:legendPos val="b"/>
+      <c:overlay val="0"/>
+      <c:spPr>
+        <a:noFill/>
+        <a:ln>
+          <a:noFill/>
+        </a:ln>
+        <a:effectLst/>
+      </c:spPr>
+      <c:txPr>
+        <a:bodyPr rot="0" spcFirstLastPara="1" vertOverflow="ellipsis" vert="horz" wrap="square" anchor="ctr" anchorCtr="1"/>
+        <a:lstStyle/>
+        <a:p>
+          <a:pPr>
+            <a:defRPr sz="900" b="0" i="0" u="none" strike="noStrike" kern="1200" baseline="0">
+              <a:solidFill>
+                <a:schemeClr val="tx1">
+                  <a:lumMod val="65000"/>
+                  <a:lumOff val="35000"/>
+                </a:schemeClr>
+              </a:solidFill>
+              <a:latin typeface="+mn-lt"/>
+              <a:ea typeface="+mn-ea"/>
+              <a:cs typeface="+mn-cs"/>
+            </a:defRPr>
+          </a:pPr>
+          <a:endParaRPr lang="en-US"/>
+        </a:p>
+      </c:txPr>
+    </c:legend>
+    <c:plotVisOnly val="1"/>
+    <c:dispBlanksAs val="gap"/>
+    <c:extLst>
+      <c:ext xmlns:c16r3="http://schemas.microsoft.com/office/drawing/2017/03/chart" uri="{56B9EC1D-385E-4148-901F-78D8002777C0}">
+        <c16r3:dataDisplayOptions16>
+          <c16r3:dispNaAsBlank val="1"/>
+        </c16r3:dataDisplayOptions16>
+      </c:ext>
+    </c:extLst>
+    <c:showDLblsOverMax val="0"/>
+  </c:chart>
+  <c:spPr>
+    <a:noFill/>
+    <a:ln>
+      <a:noFill/>
+    </a:ln>
+    <a:effectLst/>
+  </c:spPr>
+  <c:txPr>
+    <a:bodyPr/>
+    <a:lstStyle/>
+    <a:p>
+      <a:pPr>
+        <a:defRPr/>
+      </a:pPr>
+      <a:endParaRPr lang="en-US"/>
+    </a:p>
+  </c:txPr>
+  <c:externalData r:id="rId3">
+    <c:autoUpdate val="0"/>
+  </c:externalData>
+</c:chartSpace>
+</file>
+
+<file path=ppt/charts/colors1.xml><?xml version="1.0" encoding="utf-8"?>
+<cs:colorStyle xmlns:cs="http://schemas.microsoft.com/office/drawing/2012/chartStyle" xmlns:a="http://schemas.openxmlformats.org/drawingml/2006/main" meth="cycle" id="10">
+  <a:schemeClr val="accent1"/>
+  <a:schemeClr val="accent2"/>
+  <a:schemeClr val="accent3"/>
+  <a:schemeClr val="accent4"/>
+  <a:schemeClr val="accent5"/>
+  <a:schemeClr val="accent6"/>
+  <cs:variation/>
+  <cs:variation>
+    <a:lumMod val="60000"/>
+  </cs:variation>
+  <cs:variation>
+    <a:lumMod val="80000"/>
+    <a:lumOff val="20000"/>
+  </cs:variation>
+  <cs:variation>
+    <a:lumMod val="80000"/>
+  </cs:variation>
+  <cs:variation>
+    <a:lumMod val="60000"/>
+    <a:lumOff val="40000"/>
+  </cs:variation>
+  <cs:variation>
+    <a:lumMod val="50000"/>
+  </cs:variation>
+  <cs:variation>
+    <a:lumMod val="70000"/>
+    <a:lumOff val="30000"/>
+  </cs:variation>
+  <cs:variation>
+    <a:lumMod val="70000"/>
+  </cs:variation>
+  <cs:variation>
+    <a:lumMod val="50000"/>
+    <a:lumOff val="50000"/>
+  </cs:variation>
+</cs:colorStyle>
+</file>
+
+<file path=ppt/charts/style1.xml><?xml version="1.0" encoding="utf-8"?>
+<cs:chartStyle xmlns:cs="http://schemas.microsoft.com/office/drawing/2012/chartStyle" xmlns:a="http://schemas.openxmlformats.org/drawingml/2006/main" id="251">
+  <cs:axisTitle>
+    <cs:lnRef idx="0"/>
+    <cs:fillRef idx="0"/>
+    <cs:effectRef idx="0"/>
+    <cs:fontRef idx="minor">
+      <a:schemeClr val="tx1">
+        <a:lumMod val="65000"/>
+        <a:lumOff val="35000"/>
+      </a:schemeClr>
+    </cs:fontRef>
+    <cs:defRPr sz="1000" kern="1200"/>
+  </cs:axisTitle>
+  <cs:categoryAxis>
+    <cs:lnRef idx="0"/>
+    <cs:fillRef idx="0"/>
+    <cs:effectRef idx="0"/>
+    <cs:fontRef idx="minor">
+      <a:schemeClr val="tx1">
+        <a:lumMod val="65000"/>
+        <a:lumOff val="35000"/>
+      </a:schemeClr>
+    </cs:fontRef>
+    <cs:spPr>
+      <a:ln w="9525" cap="flat" cmpd="sng" algn="ctr">
+        <a:solidFill>
+          <a:schemeClr val="tx1">
+            <a:lumMod val="15000"/>
+            <a:lumOff val="85000"/>
+          </a:schemeClr>
+        </a:solidFill>
+        <a:round/>
+      </a:ln>
+    </cs:spPr>
+    <cs:defRPr sz="900" kern="1200"/>
+  </cs:categoryAxis>
+  <cs:chartArea mods="allowNoFillOverride allowNoLineOverride">
+    <cs:lnRef idx="0"/>
+    <cs:fillRef idx="0"/>
+    <cs:effectRef idx="0"/>
+    <cs:fontRef idx="minor">
+      <a:schemeClr val="tx1"/>
+    </cs:fontRef>
+    <cs:spPr>
+      <a:solidFill>
+        <a:schemeClr val="bg1"/>
+      </a:solidFill>
+      <a:ln w="9525" cap="flat" cmpd="sng" algn="ctr">
+        <a:solidFill>
+          <a:schemeClr val="tx1">
+            <a:lumMod val="15000"/>
+            <a:lumOff val="85000"/>
+          </a:schemeClr>
+        </a:solidFill>
+        <a:round/>
+      </a:ln>
+    </cs:spPr>
+    <cs:defRPr sz="900" kern="1200"/>
+  </cs:chartArea>
+  <cs:dataLabel>
+    <cs:lnRef idx="0"/>
+    <cs:fillRef idx="0"/>
+    <cs:effectRef idx="0"/>
+    <cs:fontRef idx="minor">
+      <a:schemeClr val="tx1">
+        <a:lumMod val="75000"/>
+        <a:lumOff val="25000"/>
+      </a:schemeClr>
+    </cs:fontRef>
+    <cs:defRPr sz="900" kern="1200"/>
+  </cs:dataLabel>
+  <cs:dataLabelCallout>
+    <cs:lnRef idx="0"/>
+    <cs:fillRef idx="0"/>
+    <cs:effectRef idx="0"/>
+    <cs:fontRef idx="minor">
+      <a:schemeClr val="dk1">
+        <a:lumMod val="65000"/>
+        <a:lumOff val="35000"/>
+      </a:schemeClr>
+    </cs:fontRef>
+    <cs:spPr>
+      <a:solidFill>
+        <a:schemeClr val="lt1"/>
+      </a:solidFill>
+      <a:ln>
+        <a:solidFill>
+          <a:schemeClr val="dk1">
+            <a:lumMod val="25000"/>
+            <a:lumOff val="75000"/>
+          </a:schemeClr>
+        </a:solidFill>
+      </a:ln>
+    </cs:spPr>
+    <cs:defRPr sz="900" kern="1200"/>
+    <cs:bodyPr rot="0" spcFirstLastPara="1" vertOverflow="clip" horzOverflow="clip" vert="horz" wrap="square" lIns="36576" tIns="18288" rIns="36576" bIns="18288" anchor="ctr" anchorCtr="1">
+      <a:spAutoFit/>
+    </cs:bodyPr>
+  </cs:dataLabelCallout>
+  <cs:dataPoint>
+    <cs:lnRef idx="0"/>
+    <cs:fillRef idx="1">
+      <cs:styleClr val="auto"/>
+    </cs:fillRef>
+    <cs:effectRef idx="0"/>
+    <cs:fontRef idx="minor">
+      <a:schemeClr val="tx1"/>
+    </cs:fontRef>
+    <cs:spPr>
+      <a:ln w="19050">
+        <a:solidFill>
+          <a:schemeClr val="lt1"/>
+        </a:solidFill>
+      </a:ln>
+    </cs:spPr>
+  </cs:dataPoint>
+  <cs:dataPoint3D>
+    <cs:lnRef idx="0"/>
+    <cs:fillRef idx="1">
+      <cs:styleClr val="auto"/>
+    </cs:fillRef>
+    <cs:effectRef idx="0"/>
+    <cs:fontRef idx="minor">
+      <a:schemeClr val="tx1"/>
+    </cs:fontRef>
+    <cs:spPr>
+      <a:ln w="25400">
+        <a:solidFill>
+          <a:schemeClr val="lt1"/>
+        </a:solidFill>
+      </a:ln>
+    </cs:spPr>
+  </cs:dataPoint3D>
+  <cs:dataPointLine>
+    <cs:lnRef idx="0">
+      <cs:styleClr val="auto"/>
+    </cs:lnRef>
+    <cs:fillRef idx="0"/>
+    <cs:effectRef idx="0"/>
+    <cs:fontRef idx="minor">
+      <a:schemeClr val="tx1"/>
+    </cs:fontRef>
+    <cs:spPr>
+      <a:ln w="28575" cap="rnd">
+        <a:solidFill>
+          <a:schemeClr val="phClr"/>
+        </a:solidFill>
+        <a:round/>
+      </a:ln>
+    </cs:spPr>
+  </cs:dataPointLine>
+  <cs:dataPointMarker>
+    <cs:lnRef idx="0">
+      <cs:styleClr val="auto"/>
+    </cs:lnRef>
+    <cs:fillRef idx="1">
+      <cs:styleClr val="auto"/>
+    </cs:fillRef>
+    <cs:effectRef idx="0"/>
+    <cs:fontRef idx="minor">
+      <a:schemeClr val="tx1"/>
+    </cs:fontRef>
+    <cs:spPr>
+      <a:ln w="9525">
+        <a:solidFill>
+          <a:schemeClr val="phClr"/>
+        </a:solidFill>
+      </a:ln>
+    </cs:spPr>
+  </cs:dataPointMarker>
+  <cs:dataPointMarkerLayout symbol="circle" size="5"/>
+  <cs:dataPointWireframe>
+    <cs:lnRef idx="0">
+      <cs:styleClr val="auto"/>
+    </cs:lnRef>
+    <cs:fillRef idx="0"/>
+    <cs:effectRef idx="0"/>
+    <cs:fontRef idx="minor">
+      <a:schemeClr val="tx1"/>
+    </cs:fontRef>
+    <cs:spPr>
+      <a:ln w="9525" cap="rnd">
+        <a:solidFill>
+          <a:schemeClr val="phClr"/>
+        </a:solidFill>
+        <a:round/>
+      </a:ln>
+    </cs:spPr>
+  </cs:dataPointWireframe>
+  <cs:dataTable>
+    <cs:lnRef idx="0"/>
+    <cs:fillRef idx="0"/>
+    <cs:effectRef idx="0"/>
+    <cs:fontRef idx="minor">
+      <a:schemeClr val="tx1">
+        <a:lumMod val="65000"/>
+        <a:lumOff val="35000"/>
+      </a:schemeClr>
+    </cs:fontRef>
+    <cs:spPr>
+      <a:noFill/>
+      <a:ln w="9525" cap="flat" cmpd="sng" algn="ctr">
+        <a:solidFill>
+          <a:schemeClr val="tx1">
+            <a:lumMod val="15000"/>
+            <a:lumOff val="85000"/>
+          </a:schemeClr>
+        </a:solidFill>
+        <a:round/>
+      </a:ln>
+    </cs:spPr>
+    <cs:defRPr sz="900" kern="1200"/>
+  </cs:dataTable>
+  <cs:downBar>
+    <cs:lnRef idx="0"/>
+    <cs:fillRef idx="0"/>
+    <cs:effectRef idx="0"/>
+    <cs:fontRef idx="minor">
+      <a:schemeClr val="tx1"/>
+    </cs:fontRef>
+    <cs:spPr>
+      <a:solidFill>
+        <a:schemeClr val="dk1">
+          <a:lumMod val="75000"/>
+          <a:lumOff val="25000"/>
+        </a:schemeClr>
+      </a:solidFill>
+      <a:ln w="9525" cap="flat" cmpd="sng" algn="ctr">
+        <a:solidFill>
+          <a:schemeClr val="tx1">
+            <a:lumMod val="65000"/>
+            <a:lumOff val="35000"/>
+          </a:schemeClr>
+        </a:solidFill>
+        <a:round/>
+      </a:ln>
+    </cs:spPr>
+  </cs:downBar>
+  <cs:dropLine>
+    <cs:lnRef idx="0"/>
+    <cs:fillRef idx="0"/>
+    <cs:effectRef idx="0"/>
+    <cs:fontRef idx="minor">
+      <a:schemeClr val="tx1"/>
+    </cs:fontRef>
+    <cs:spPr>
+      <a:ln w="9525" cap="flat" cmpd="sng" algn="ctr">
+        <a:solidFill>
+          <a:schemeClr val="tx1">
+            <a:lumMod val="35000"/>
+            <a:lumOff val="65000"/>
+          </a:schemeClr>
+        </a:solidFill>
+        <a:round/>
+      </a:ln>
+    </cs:spPr>
+  </cs:dropLine>
+  <cs:errorBar>
+    <cs:lnRef idx="0"/>
+    <cs:fillRef idx="0"/>
+    <cs:effectRef idx="0"/>
+    <cs:fontRef idx="minor">
+      <a:schemeClr val="tx1"/>
+    </cs:fontRef>
+    <cs:spPr>
+      <a:ln w="9525" cap="flat" cmpd="sng" algn="ctr">
+        <a:solidFill>
+          <a:schemeClr val="tx1">
+            <a:lumMod val="65000"/>
+            <a:lumOff val="35000"/>
+          </a:schemeClr>
+        </a:solidFill>
+        <a:round/>
+      </a:ln>
+    </cs:spPr>
+  </cs:errorBar>
+  <cs:floor>
+    <cs:lnRef idx="0"/>
+    <cs:fillRef idx="0"/>
+    <cs:effectRef idx="0"/>
+    <cs:fontRef idx="minor">
+      <a:schemeClr val="tx1"/>
+    </cs:fontRef>
+    <cs:spPr>
+      <a:noFill/>
+      <a:ln>
+        <a:noFill/>
+      </a:ln>
+    </cs:spPr>
+  </cs:floor>
+  <cs:gridlineMajor>
+    <cs:lnRef idx="0"/>
+    <cs:fillRef idx="0"/>
+    <cs:effectRef idx="0"/>
+    <cs:fontRef idx="minor">
+      <a:schemeClr val="tx1"/>
+    </cs:fontRef>
+    <cs:spPr>
+      <a:ln w="9525" cap="flat" cmpd="sng" algn="ctr">
+        <a:solidFill>
+          <a:schemeClr val="tx1">
+            <a:lumMod val="15000"/>
+            <a:lumOff val="85000"/>
+          </a:schemeClr>
+        </a:solidFill>
+        <a:round/>
+      </a:ln>
+    </cs:spPr>
+  </cs:gridlineMajor>
+  <cs:gridlineMinor>
+    <cs:lnRef idx="0"/>
+    <cs:fillRef idx="0"/>
+    <cs:effectRef idx="0"/>
+    <cs:fontRef idx="minor">
+      <a:schemeClr val="tx1"/>
+    </cs:fontRef>
+    <cs:spPr>
+      <a:ln w="9525" cap="flat" cmpd="sng" algn="ctr">
+        <a:solidFill>
+          <a:schemeClr val="tx1">
+            <a:lumMod val="5000"/>
+            <a:lumOff val="95000"/>
+          </a:schemeClr>
+        </a:solidFill>
+        <a:round/>
+      </a:ln>
+    </cs:spPr>
+  </cs:gridlineMinor>
+  <cs:hiLoLine>
+    <cs:lnRef idx="0"/>
+    <cs:fillRef idx="0"/>
+    <cs:effectRef idx="0"/>
+    <cs:fontRef idx="minor">
+      <a:schemeClr val="tx1"/>
+    </cs:fontRef>
+    <cs:spPr>
+      <a:ln w="9525" cap="flat" cmpd="sng" algn="ctr">
+        <a:solidFill>
+          <a:schemeClr val="tx1">
+            <a:lumMod val="50000"/>
+            <a:lumOff val="50000"/>
+          </a:schemeClr>
+        </a:solidFill>
+        <a:round/>
+      </a:ln>
+    </cs:spPr>
+  </cs:hiLoLine>
+  <cs:leaderLine>
+    <cs:lnRef idx="0"/>
+    <cs:fillRef idx="0"/>
+    <cs:effectRef idx="0"/>
+    <cs:fontRef idx="minor">
+      <a:schemeClr val="tx1"/>
+    </cs:fontRef>
+    <cs:spPr>
+      <a:ln w="9525" cap="flat" cmpd="sng" algn="ctr">
+        <a:solidFill>
+          <a:schemeClr val="tx1">
+            <a:lumMod val="35000"/>
+            <a:lumOff val="65000"/>
+          </a:schemeClr>
+        </a:solidFill>
+        <a:round/>
+      </a:ln>
+    </cs:spPr>
+  </cs:leaderLine>
+  <cs:legend>
+    <cs:lnRef idx="0"/>
+    <cs:fillRef idx="0"/>
+    <cs:effectRef idx="0"/>
+    <cs:fontRef idx="minor">
+      <a:schemeClr val="tx1">
+        <a:lumMod val="65000"/>
+        <a:lumOff val="35000"/>
+      </a:schemeClr>
+    </cs:fontRef>
+    <cs:defRPr sz="900" kern="1200"/>
+  </cs:legend>
+  <cs:plotArea mods="allowNoFillOverride allowNoLineOverride">
+    <cs:lnRef idx="0"/>
+    <cs:fillRef idx="0"/>
+    <cs:effectRef idx="0"/>
+    <cs:fontRef idx="minor">
+      <a:schemeClr val="tx1"/>
+    </cs:fontRef>
+  </cs:plotArea>
+  <cs:plotArea3D mods="allowNoFillOverride allowNoLineOverride">
+    <cs:lnRef idx="0"/>
+    <cs:fillRef idx="0"/>
+    <cs:effectRef idx="0"/>
+    <cs:fontRef idx="minor">
+      <a:schemeClr val="tx1"/>
+    </cs:fontRef>
+  </cs:plotArea3D>
+  <cs:seriesAxis>
+    <cs:lnRef idx="0"/>
+    <cs:fillRef idx="0"/>
+    <cs:effectRef idx="0"/>
+    <cs:fontRef idx="minor">
+      <a:schemeClr val="tx1">
+        <a:lumMod val="65000"/>
+        <a:lumOff val="35000"/>
+      </a:schemeClr>
+    </cs:fontRef>
+    <cs:defRPr sz="900" kern="1200"/>
+  </cs:seriesAxis>
+  <cs:seriesLine>
+    <cs:lnRef idx="0"/>
+    <cs:fillRef idx="0"/>
+    <cs:effectRef idx="0"/>
+    <cs:fontRef idx="minor">
+      <a:schemeClr val="tx1"/>
+    </cs:fontRef>
+    <cs:spPr>
+      <a:ln w="9525" cap="flat" cmpd="sng" algn="ctr">
+        <a:solidFill>
+          <a:schemeClr val="tx1">
+            <a:lumMod val="35000"/>
+            <a:lumOff val="65000"/>
+          </a:schemeClr>
+        </a:solidFill>
+        <a:round/>
+      </a:ln>
+    </cs:spPr>
+  </cs:seriesLine>
+  <cs:title>
+    <cs:lnRef idx="0"/>
+    <cs:fillRef idx="0"/>
+    <cs:effectRef idx="0"/>
+    <cs:fontRef idx="minor">
+      <a:schemeClr val="tx1">
+        <a:lumMod val="65000"/>
+        <a:lumOff val="35000"/>
+      </a:schemeClr>
+    </cs:fontRef>
+    <cs:defRPr sz="1400" b="0" kern="1200" spc="0" baseline="0"/>
+  </cs:title>
+  <cs:trendline>
+    <cs:lnRef idx="0">
+      <cs:styleClr val="auto"/>
+    </cs:lnRef>
+    <cs:fillRef idx="0"/>
+    <cs:effectRef idx="0"/>
+    <cs:fontRef idx="minor">
+      <a:schemeClr val="tx1"/>
+    </cs:fontRef>
+    <cs:spPr>
+      <a:ln w="19050" cap="rnd">
+        <a:solidFill>
+          <a:schemeClr val="phClr"/>
+        </a:solidFill>
+        <a:prstDash val="sysDot"/>
+      </a:ln>
+    </cs:spPr>
+  </cs:trendline>
+  <cs:trendlineLabel>
+    <cs:lnRef idx="0"/>
+    <cs:fillRef idx="0"/>
+    <cs:effectRef idx="0"/>
+    <cs:fontRef idx="minor">
+      <a:schemeClr val="tx1">
+        <a:lumMod val="65000"/>
+        <a:lumOff val="35000"/>
+      </a:schemeClr>
+    </cs:fontRef>
+    <cs:defRPr sz="900" kern="1200"/>
+  </cs:trendlineLabel>
+  <cs:upBar>
+    <cs:lnRef idx="0"/>
+    <cs:fillRef idx="0"/>
+    <cs:effectRef idx="0"/>
+    <cs:fontRef idx="minor">
+      <a:schemeClr val="tx1"/>
+    </cs:fontRef>
+    <cs:spPr>
+      <a:solidFill>
+        <a:schemeClr val="lt1"/>
+      </a:solidFill>
+      <a:ln w="9525" cap="flat" cmpd="sng" algn="ctr">
+        <a:solidFill>
+          <a:schemeClr val="tx1">
+            <a:lumMod val="65000"/>
+            <a:lumOff val="35000"/>
+          </a:schemeClr>
+        </a:solidFill>
+        <a:round/>
+      </a:ln>
+    </cs:spPr>
+  </cs:upBar>
+  <cs:valueAxis>
+    <cs:lnRef idx="0"/>
+    <cs:fillRef idx="0"/>
+    <cs:effectRef idx="0"/>
+    <cs:fontRef idx="minor">
+      <a:schemeClr val="tx1">
+        <a:lumMod val="65000"/>
+        <a:lumOff val="35000"/>
+      </a:schemeClr>
+    </cs:fontRef>
+    <cs:defRPr sz="900" kern="1200"/>
+  </cs:valueAxis>
+  <cs:wall>
+    <cs:lnRef idx="0"/>
+    <cs:fillRef idx="0"/>
+    <cs:effectRef idx="0"/>
+    <cs:fontRef idx="minor">
+      <a:schemeClr val="tx1"/>
+    </cs:fontRef>
+    <cs:spPr>
+      <a:noFill/>
+      <a:ln>
+        <a:noFill/>
+      </a:ln>
+    </cs:spPr>
+  </cs:wall>
+</cs:chartStyle>
 </file>
 
 <file path=ppt/slideLayouts/slideLayout1.xml><?xml version="1.0" encoding="utf-8"?>
@@ -3386,12 +4322,668 @@
               <a:t>Sean Tok</a:t>
             </a:r>
           </a:p>
+          <a:p>
+            <a:r>
+              <a:rPr lang="en-US" dirty="0"/>
+              <a:t>9/5/2024</a:t>
+            </a:r>
+          </a:p>
         </p:txBody>
       </p:sp>
     </p:spTree>
     <p:extLst>
       <p:ext uri="{BB962C8B-B14F-4D97-AF65-F5344CB8AC3E}">
         <p14:creationId xmlns:p14="http://schemas.microsoft.com/office/powerpoint/2010/main" val="558681475"/>
+      </p:ext>
+    </p:extLst>
+  </p:cSld>
+  <p:clrMapOvr>
+    <a:masterClrMapping/>
+  </p:clrMapOvr>
+</p:sld>
+</file>
+
+<file path=ppt/slides/slide10.xml><?xml version="1.0" encoding="utf-8"?>
+<p:sld xmlns:a="http://schemas.openxmlformats.org/drawingml/2006/main" xmlns:r="http://schemas.openxmlformats.org/officeDocument/2006/relationships" xmlns:p="http://schemas.openxmlformats.org/presentationml/2006/main">
+  <p:cSld>
+    <p:spTree>
+      <p:nvGrpSpPr>
+        <p:cNvPr id="1" name=""/>
+        <p:cNvGrpSpPr/>
+        <p:nvPr/>
+      </p:nvGrpSpPr>
+      <p:grpSpPr>
+        <a:xfrm>
+          <a:off x="0" y="0"/>
+          <a:ext cx="0" cy="0"/>
+          <a:chOff x="0" y="0"/>
+          <a:chExt cx="0" cy="0"/>
+        </a:xfrm>
+      </p:grpSpPr>
+      <p:sp>
+        <p:nvSpPr>
+          <p:cNvPr id="2" name="Title 1">
+            <a:extLst>
+              <a:ext uri="{FF2B5EF4-FFF2-40B4-BE49-F238E27FC236}">
+                <a16:creationId xmlns:a16="http://schemas.microsoft.com/office/drawing/2014/main" id="{FED1FCBF-EBB5-0E58-E1C0-6E73FF328EA4}"/>
+              </a:ext>
+            </a:extLst>
+          </p:cNvPr>
+          <p:cNvSpPr>
+            <a:spLocks noGrp="1"/>
+          </p:cNvSpPr>
+          <p:nvPr>
+            <p:ph type="title"/>
+          </p:nvPr>
+        </p:nvSpPr>
+        <p:spPr/>
+        <p:txBody>
+          <a:bodyPr/>
+          <a:lstStyle/>
+          <a:p>
+            <a:r>
+              <a:rPr lang="en-US" dirty="0"/>
+              <a:t>Results (Statistical analyses)</a:t>
+            </a:r>
+          </a:p>
+        </p:txBody>
+      </p:sp>
+      <p:sp>
+        <p:nvSpPr>
+          <p:cNvPr id="3" name="Content Placeholder 2">
+            <a:extLst>
+              <a:ext uri="{FF2B5EF4-FFF2-40B4-BE49-F238E27FC236}">
+                <a16:creationId xmlns:a16="http://schemas.microsoft.com/office/drawing/2014/main" id="{AFD74CD3-5E1B-5B0F-422C-A81BF91534A1}"/>
+              </a:ext>
+            </a:extLst>
+          </p:cNvPr>
+          <p:cNvSpPr>
+            <a:spLocks noGrp="1"/>
+          </p:cNvSpPr>
+          <p:nvPr>
+            <p:ph idx="1"/>
+          </p:nvPr>
+        </p:nvSpPr>
+        <p:spPr/>
+        <p:txBody>
+          <a:bodyPr>
+            <a:normAutofit lnSpcReduction="10000"/>
+          </a:bodyPr>
+          <a:lstStyle/>
+          <a:p>
+            <a:r>
+              <a:rPr lang="en-US" dirty="0"/>
+              <a:t>Binomial Regression to understand the contribution of individual factors to whether treatment was successful or not</a:t>
+            </a:r>
+          </a:p>
+          <a:p>
+            <a:r>
+              <a:rPr lang="en-US" dirty="0" err="1"/>
+              <a:t>glm</a:t>
+            </a:r>
+            <a:r>
+              <a:rPr lang="en-US" dirty="0"/>
+              <a:t>(outcome~., data=</a:t>
+            </a:r>
+            <a:r>
+              <a:rPr lang="en-US" dirty="0" err="1"/>
+              <a:t>stat_data,family</a:t>
+            </a:r>
+            <a:r>
+              <a:rPr lang="en-US" dirty="0"/>
+              <a:t>=‘binomial’)</a:t>
+            </a:r>
+          </a:p>
+          <a:p>
+            <a:pPr lvl="1"/>
+            <a:r>
+              <a:rPr lang="en-US" dirty="0"/>
+              <a:t>Where outcome is treatment outcome, coded as 1 for better, 0 for worse or neutral</a:t>
+            </a:r>
+          </a:p>
+          <a:p>
+            <a:pPr lvl="1"/>
+            <a:r>
+              <a:rPr lang="en-US" dirty="0" err="1"/>
+              <a:t>Stat_data</a:t>
+            </a:r>
+            <a:r>
+              <a:rPr lang="en-US" dirty="0"/>
+              <a:t> is the dataset containing features of interest to regress against.</a:t>
+            </a:r>
+          </a:p>
+          <a:p>
+            <a:pPr lvl="1"/>
+            <a:r>
+              <a:rPr lang="en-US" dirty="0"/>
+              <a:t>Binomial regression since the outcome is binary.</a:t>
+            </a:r>
+          </a:p>
+          <a:p>
+            <a:pPr lvl="1"/>
+            <a:endParaRPr lang="en-US" dirty="0"/>
+          </a:p>
+          <a:p>
+            <a:r>
+              <a:rPr lang="en-US" dirty="0"/>
+              <a:t>Significant findings:</a:t>
+            </a:r>
+          </a:p>
+          <a:p>
+            <a:pPr lvl="1"/>
+            <a:r>
+              <a:rPr lang="en-US" sz="2000" dirty="0" err="1"/>
+              <a:t>Trt_adt</a:t>
+            </a:r>
+            <a:r>
+              <a:rPr lang="en-US" sz="2000" dirty="0"/>
+              <a:t>, Estimate=0.307508, Std. Error=0.099625, z value=3.087, p-value=0.00202</a:t>
+            </a:r>
+          </a:p>
+          <a:p>
+            <a:r>
+              <a:rPr lang="en-US" dirty="0"/>
+              <a:t>Suggests that antidepressants significantly influence outcomes</a:t>
+            </a:r>
+          </a:p>
+        </p:txBody>
+      </p:sp>
+    </p:spTree>
+    <p:extLst>
+      <p:ext uri="{BB962C8B-B14F-4D97-AF65-F5344CB8AC3E}">
+        <p14:creationId xmlns:p14="http://schemas.microsoft.com/office/powerpoint/2010/main" val="439145089"/>
+      </p:ext>
+    </p:extLst>
+  </p:cSld>
+  <p:clrMapOvr>
+    <a:masterClrMapping/>
+  </p:clrMapOvr>
+</p:sld>
+</file>
+
+<file path=ppt/slides/slide11.xml><?xml version="1.0" encoding="utf-8"?>
+<p:sld xmlns:a="http://schemas.openxmlformats.org/drawingml/2006/main" xmlns:r="http://schemas.openxmlformats.org/officeDocument/2006/relationships" xmlns:p="http://schemas.openxmlformats.org/presentationml/2006/main">
+  <p:cSld>
+    <p:spTree>
+      <p:nvGrpSpPr>
+        <p:cNvPr id="1" name=""/>
+        <p:cNvGrpSpPr/>
+        <p:nvPr/>
+      </p:nvGrpSpPr>
+      <p:grpSpPr>
+        <a:xfrm>
+          <a:off x="0" y="0"/>
+          <a:ext cx="0" cy="0"/>
+          <a:chOff x="0" y="0"/>
+          <a:chExt cx="0" cy="0"/>
+        </a:xfrm>
+      </p:grpSpPr>
+      <p:sp>
+        <p:nvSpPr>
+          <p:cNvPr id="2" name="Title 1">
+            <a:extLst>
+              <a:ext uri="{FF2B5EF4-FFF2-40B4-BE49-F238E27FC236}">
+                <a16:creationId xmlns:a16="http://schemas.microsoft.com/office/drawing/2014/main" id="{D5EBFF81-AD13-3323-D69A-613817DB64FB}"/>
+              </a:ext>
+            </a:extLst>
+          </p:cNvPr>
+          <p:cNvSpPr>
+            <a:spLocks noGrp="1"/>
+          </p:cNvSpPr>
+          <p:nvPr>
+            <p:ph type="title"/>
+          </p:nvPr>
+        </p:nvSpPr>
+        <p:spPr/>
+        <p:txBody>
+          <a:bodyPr/>
+          <a:lstStyle/>
+          <a:p>
+            <a:r>
+              <a:rPr lang="en-US" dirty="0"/>
+              <a:t>Key conclusions</a:t>
+            </a:r>
+          </a:p>
+        </p:txBody>
+      </p:sp>
+      <p:sp>
+        <p:nvSpPr>
+          <p:cNvPr id="3" name="Content Placeholder 2">
+            <a:extLst>
+              <a:ext uri="{FF2B5EF4-FFF2-40B4-BE49-F238E27FC236}">
+                <a16:creationId xmlns:a16="http://schemas.microsoft.com/office/drawing/2014/main" id="{556F609D-EB7C-7AF6-E1C8-9F93CC723A6F}"/>
+              </a:ext>
+            </a:extLst>
+          </p:cNvPr>
+          <p:cNvSpPr>
+            <a:spLocks noGrp="1"/>
+          </p:cNvSpPr>
+          <p:nvPr>
+            <p:ph idx="1"/>
+          </p:nvPr>
+        </p:nvSpPr>
+        <p:spPr>
+          <a:xfrm>
+            <a:off x="838200" y="1825625"/>
+            <a:ext cx="10392052" cy="4351338"/>
+          </a:xfrm>
+        </p:spPr>
+        <p:txBody>
+          <a:bodyPr>
+            <a:normAutofit/>
+          </a:bodyPr>
+          <a:lstStyle/>
+          <a:p>
+            <a:r>
+              <a:rPr lang="en-US" dirty="0"/>
+              <a:t>There may be 2 age groups that are more susceptible to MDD based on age distributions</a:t>
+            </a:r>
+          </a:p>
+          <a:p>
+            <a:r>
+              <a:rPr lang="en-US" dirty="0"/>
+              <a:t>84% of patients have 3 or more symptoms concurrently</a:t>
+            </a:r>
+          </a:p>
+          <a:p>
+            <a:r>
+              <a:rPr lang="en-US" dirty="0"/>
+              <a:t>90% of patients receive 3 or more treatments concurrently</a:t>
+            </a:r>
+          </a:p>
+          <a:p>
+            <a:r>
+              <a:rPr lang="en-US" dirty="0"/>
+              <a:t>Treatment outcomes appear to be significantly influenced by antidepressant treatments.</a:t>
+            </a:r>
+          </a:p>
+          <a:p>
+            <a:endParaRPr lang="en-US" dirty="0"/>
+          </a:p>
+        </p:txBody>
+      </p:sp>
+    </p:spTree>
+    <p:extLst>
+      <p:ext uri="{BB962C8B-B14F-4D97-AF65-F5344CB8AC3E}">
+        <p14:creationId xmlns:p14="http://schemas.microsoft.com/office/powerpoint/2010/main" val="1326501463"/>
+      </p:ext>
+    </p:extLst>
+  </p:cSld>
+  <p:clrMapOvr>
+    <a:masterClrMapping/>
+  </p:clrMapOvr>
+</p:sld>
+</file>
+
+<file path=ppt/slides/slide12.xml><?xml version="1.0" encoding="utf-8"?>
+<p:sld xmlns:a="http://schemas.openxmlformats.org/drawingml/2006/main" xmlns:r="http://schemas.openxmlformats.org/officeDocument/2006/relationships" xmlns:p="http://schemas.openxmlformats.org/presentationml/2006/main">
+  <p:cSld>
+    <p:spTree>
+      <p:nvGrpSpPr>
+        <p:cNvPr id="1" name=""/>
+        <p:cNvGrpSpPr/>
+        <p:nvPr/>
+      </p:nvGrpSpPr>
+      <p:grpSpPr>
+        <a:xfrm>
+          <a:off x="0" y="0"/>
+          <a:ext cx="0" cy="0"/>
+          <a:chOff x="0" y="0"/>
+          <a:chExt cx="0" cy="0"/>
+        </a:xfrm>
+      </p:grpSpPr>
+      <p:sp>
+        <p:nvSpPr>
+          <p:cNvPr id="2" name="Title 1">
+            <a:extLst>
+              <a:ext uri="{FF2B5EF4-FFF2-40B4-BE49-F238E27FC236}">
+                <a16:creationId xmlns:a16="http://schemas.microsoft.com/office/drawing/2014/main" id="{C59C9C59-432B-A8B7-4A21-8BAA741C0764}"/>
+              </a:ext>
+            </a:extLst>
+          </p:cNvPr>
+          <p:cNvSpPr>
+            <a:spLocks noGrp="1"/>
+          </p:cNvSpPr>
+          <p:nvPr>
+            <p:ph type="title"/>
+          </p:nvPr>
+        </p:nvSpPr>
+        <p:spPr/>
+        <p:txBody>
+          <a:bodyPr/>
+          <a:lstStyle/>
+          <a:p>
+            <a:r>
+              <a:rPr lang="en-US" dirty="0"/>
+              <a:t>Further analysis</a:t>
+            </a:r>
+          </a:p>
+        </p:txBody>
+      </p:sp>
+      <p:sp>
+        <p:nvSpPr>
+          <p:cNvPr id="3" name="Content Placeholder 2">
+            <a:extLst>
+              <a:ext uri="{FF2B5EF4-FFF2-40B4-BE49-F238E27FC236}">
+                <a16:creationId xmlns:a16="http://schemas.microsoft.com/office/drawing/2014/main" id="{16C1A59D-3FDD-91E0-1583-38AE2D78A12F}"/>
+              </a:ext>
+            </a:extLst>
+          </p:cNvPr>
+          <p:cNvSpPr>
+            <a:spLocks noGrp="1"/>
+          </p:cNvSpPr>
+          <p:nvPr>
+            <p:ph idx="1"/>
+          </p:nvPr>
+        </p:nvSpPr>
+        <p:spPr/>
+        <p:txBody>
+          <a:bodyPr>
+            <a:normAutofit fontScale="92500" lnSpcReduction="20000"/>
+          </a:bodyPr>
+          <a:lstStyle/>
+          <a:p>
+            <a:r>
+              <a:rPr lang="en-US" dirty="0"/>
+              <a:t>Stratify patients based on age groups (bimodal appears like 2 overlapping gaussians, gaussian </a:t>
+            </a:r>
+            <a:r>
+              <a:rPr lang="en-US" dirty="0" err="1"/>
+              <a:t>demixing</a:t>
+            </a:r>
+            <a:r>
+              <a:rPr lang="en-US" dirty="0"/>
+              <a:t>)</a:t>
+            </a:r>
+          </a:p>
+          <a:p>
+            <a:r>
+              <a:rPr lang="en-US" dirty="0"/>
+              <a:t>Diagnostic tests for normality, heteroscedasticity, etc.</a:t>
+            </a:r>
+          </a:p>
+          <a:p>
+            <a:r>
+              <a:rPr lang="en-US" dirty="0"/>
+              <a:t>Investigate multicollinearity in dataset.</a:t>
+            </a:r>
+          </a:p>
+          <a:p>
+            <a:r>
+              <a:rPr lang="en-US" dirty="0"/>
+              <a:t>Run post-hoc test and adjustments for multiple comparisons</a:t>
+            </a:r>
+          </a:p>
+          <a:p>
+            <a:r>
+              <a:rPr lang="en-US" dirty="0"/>
+              <a:t>Run analysis with NAs included, by dropping the columns instead. (should be guided by literature)</a:t>
+            </a:r>
+          </a:p>
+          <a:p>
+            <a:r>
+              <a:rPr lang="en-US" dirty="0"/>
+              <a:t>Since outcome does not quantitively measure treatment effect, another model could be applied (e.g., ordinal logistic regression)?</a:t>
+            </a:r>
+          </a:p>
+          <a:p>
+            <a:r>
+              <a:rPr lang="en-US" dirty="0"/>
+              <a:t>Model the dataset with mixed effects to account for patient heterogeneity?</a:t>
+            </a:r>
+          </a:p>
+          <a:p>
+            <a:r>
+              <a:rPr lang="en-US" dirty="0"/>
+              <a:t>Higher-order interactions</a:t>
+            </a:r>
+          </a:p>
+        </p:txBody>
+      </p:sp>
+    </p:spTree>
+    <p:extLst>
+      <p:ext uri="{BB962C8B-B14F-4D97-AF65-F5344CB8AC3E}">
+        <p14:creationId xmlns:p14="http://schemas.microsoft.com/office/powerpoint/2010/main" val="3201906507"/>
+      </p:ext>
+    </p:extLst>
+  </p:cSld>
+  <p:clrMapOvr>
+    <a:masterClrMapping/>
+  </p:clrMapOvr>
+</p:sld>
+</file>
+
+<file path=ppt/slides/slide13.xml><?xml version="1.0" encoding="utf-8"?>
+<p:sld xmlns:a="http://schemas.openxmlformats.org/drawingml/2006/main" xmlns:r="http://schemas.openxmlformats.org/officeDocument/2006/relationships" xmlns:p="http://schemas.openxmlformats.org/presentationml/2006/main">
+  <p:cSld>
+    <p:spTree>
+      <p:nvGrpSpPr>
+        <p:cNvPr id="1" name=""/>
+        <p:cNvGrpSpPr/>
+        <p:nvPr/>
+      </p:nvGrpSpPr>
+      <p:grpSpPr>
+        <a:xfrm>
+          <a:off x="0" y="0"/>
+          <a:ext cx="0" cy="0"/>
+          <a:chOff x="0" y="0"/>
+          <a:chExt cx="0" cy="0"/>
+        </a:xfrm>
+      </p:grpSpPr>
+      <p:sp>
+        <p:nvSpPr>
+          <p:cNvPr id="2" name="Title 1">
+            <a:extLst>
+              <a:ext uri="{FF2B5EF4-FFF2-40B4-BE49-F238E27FC236}">
+                <a16:creationId xmlns:a16="http://schemas.microsoft.com/office/drawing/2014/main" id="{D88D3F92-E990-62CD-FF8A-0C3B03E21162}"/>
+              </a:ext>
+            </a:extLst>
+          </p:cNvPr>
+          <p:cNvSpPr>
+            <a:spLocks noGrp="1"/>
+          </p:cNvSpPr>
+          <p:nvPr>
+            <p:ph type="title"/>
+          </p:nvPr>
+        </p:nvSpPr>
+        <p:spPr/>
+        <p:txBody>
+          <a:bodyPr/>
+          <a:lstStyle/>
+          <a:p>
+            <a:r>
+              <a:rPr lang="en-US" dirty="0"/>
+              <a:t>Assumptions and limitations</a:t>
+            </a:r>
+          </a:p>
+        </p:txBody>
+      </p:sp>
+      <p:sp>
+        <p:nvSpPr>
+          <p:cNvPr id="3" name="Content Placeholder 2">
+            <a:extLst>
+              <a:ext uri="{FF2B5EF4-FFF2-40B4-BE49-F238E27FC236}">
+                <a16:creationId xmlns:a16="http://schemas.microsoft.com/office/drawing/2014/main" id="{5D3CFCC3-E901-A397-2884-E9860666DE2E}"/>
+              </a:ext>
+            </a:extLst>
+          </p:cNvPr>
+          <p:cNvSpPr>
+            <a:spLocks noGrp="1"/>
+          </p:cNvSpPr>
+          <p:nvPr>
+            <p:ph idx="1"/>
+          </p:nvPr>
+        </p:nvSpPr>
+        <p:spPr/>
+        <p:txBody>
+          <a:bodyPr>
+            <a:normAutofit fontScale="92500" lnSpcReduction="10000"/>
+          </a:bodyPr>
+          <a:lstStyle/>
+          <a:p>
+            <a:r>
+              <a:rPr lang="en-US" dirty="0"/>
+              <a:t>Assumptions:</a:t>
+            </a:r>
+          </a:p>
+          <a:p>
+            <a:pPr lvl="1"/>
+            <a:r>
+              <a:rPr lang="en-US" dirty="0"/>
+              <a:t>Demographics are representative of population (Seems representative)</a:t>
+            </a:r>
+          </a:p>
+          <a:p>
+            <a:pPr lvl="1"/>
+            <a:r>
+              <a:rPr lang="en-US" dirty="0"/>
+              <a:t>Missing data is completely at random.</a:t>
+            </a:r>
+          </a:p>
+          <a:p>
+            <a:pPr lvl="1"/>
+            <a:r>
+              <a:rPr lang="en-US" dirty="0"/>
+              <a:t>NA data removed does not significantly bias remaining data.</a:t>
+            </a:r>
+          </a:p>
+          <a:p>
+            <a:pPr lvl="1"/>
+            <a:r>
+              <a:rPr lang="en-US" dirty="0"/>
+              <a:t>Patients respond similarly to treatments.</a:t>
+            </a:r>
+          </a:p>
+          <a:p>
+            <a:pPr lvl="1"/>
+            <a:r>
+              <a:rPr lang="en-US" dirty="0"/>
+              <a:t>Other errors in dataset such as bias, duplicates, formatting, sampling and measurement error aren’t present.</a:t>
+            </a:r>
+          </a:p>
+          <a:p>
+            <a:r>
+              <a:rPr lang="en-US" dirty="0"/>
+              <a:t>Limitations</a:t>
+            </a:r>
+          </a:p>
+          <a:p>
+            <a:pPr lvl="1"/>
+            <a:r>
+              <a:rPr lang="en-US" dirty="0"/>
+              <a:t>Only 2 outcome categories, and does not quantify strength of treatment.</a:t>
+            </a:r>
+          </a:p>
+          <a:p>
+            <a:pPr lvl="1"/>
+            <a:r>
+              <a:rPr lang="en-US" dirty="0"/>
+              <a:t>Other outcome variables could be taken into account</a:t>
+            </a:r>
+          </a:p>
+          <a:p>
+            <a:pPr lvl="1"/>
+            <a:r>
+              <a:rPr lang="en-US" dirty="0"/>
+              <a:t>Many features with limited sample size. Could be influencing estimates</a:t>
+            </a:r>
+          </a:p>
+          <a:p>
+            <a:pPr lvl="1"/>
+            <a:r>
+              <a:rPr lang="en-US" dirty="0"/>
+              <a:t>More work is needed to validate the model.</a:t>
+            </a:r>
+          </a:p>
+        </p:txBody>
+      </p:sp>
+    </p:spTree>
+    <p:extLst>
+      <p:ext uri="{BB962C8B-B14F-4D97-AF65-F5344CB8AC3E}">
+        <p14:creationId xmlns:p14="http://schemas.microsoft.com/office/powerpoint/2010/main" val="1174181769"/>
+      </p:ext>
+    </p:extLst>
+  </p:cSld>
+  <p:clrMapOvr>
+    <a:masterClrMapping/>
+  </p:clrMapOvr>
+</p:sld>
+</file>
+
+<file path=ppt/slides/slide14.xml><?xml version="1.0" encoding="utf-8"?>
+<p:sld xmlns:a="http://schemas.openxmlformats.org/drawingml/2006/main" xmlns:r="http://schemas.openxmlformats.org/officeDocument/2006/relationships" xmlns:p="http://schemas.openxmlformats.org/presentationml/2006/main">
+  <p:cSld>
+    <p:spTree>
+      <p:nvGrpSpPr>
+        <p:cNvPr id="1" name=""/>
+        <p:cNvGrpSpPr/>
+        <p:nvPr/>
+      </p:nvGrpSpPr>
+      <p:grpSpPr>
+        <a:xfrm>
+          <a:off x="0" y="0"/>
+          <a:ext cx="0" cy="0"/>
+          <a:chOff x="0" y="0"/>
+          <a:chExt cx="0" cy="0"/>
+        </a:xfrm>
+      </p:grpSpPr>
+      <p:sp>
+        <p:nvSpPr>
+          <p:cNvPr id="2" name="Title 1">
+            <a:extLst>
+              <a:ext uri="{FF2B5EF4-FFF2-40B4-BE49-F238E27FC236}">
+                <a16:creationId xmlns:a16="http://schemas.microsoft.com/office/drawing/2014/main" id="{10B70A3E-B176-579F-3299-BBF149740966}"/>
+              </a:ext>
+            </a:extLst>
+          </p:cNvPr>
+          <p:cNvSpPr>
+            <a:spLocks noGrp="1"/>
+          </p:cNvSpPr>
+          <p:nvPr>
+            <p:ph type="title"/>
+          </p:nvPr>
+        </p:nvSpPr>
+        <p:spPr/>
+        <p:txBody>
+          <a:bodyPr/>
+          <a:lstStyle/>
+          <a:p>
+            <a:r>
+              <a:rPr lang="en-US" dirty="0"/>
+              <a:t>Questions?</a:t>
+            </a:r>
+          </a:p>
+        </p:txBody>
+      </p:sp>
+      <p:sp>
+        <p:nvSpPr>
+          <p:cNvPr id="3" name="Content Placeholder 2">
+            <a:extLst>
+              <a:ext uri="{FF2B5EF4-FFF2-40B4-BE49-F238E27FC236}">
+                <a16:creationId xmlns:a16="http://schemas.microsoft.com/office/drawing/2014/main" id="{255AD232-3F28-79E4-D6A3-C69D1BBAF147}"/>
+              </a:ext>
+            </a:extLst>
+          </p:cNvPr>
+          <p:cNvSpPr>
+            <a:spLocks noGrp="1"/>
+          </p:cNvSpPr>
+          <p:nvPr>
+            <p:ph idx="1"/>
+          </p:nvPr>
+        </p:nvSpPr>
+        <p:spPr/>
+        <p:txBody>
+          <a:bodyPr/>
+          <a:lstStyle/>
+          <a:p>
+            <a:endParaRPr lang="en-US"/>
+          </a:p>
+        </p:txBody>
+      </p:sp>
+    </p:spTree>
+    <p:extLst>
+      <p:ext uri="{BB962C8B-B14F-4D97-AF65-F5344CB8AC3E}">
+        <p14:creationId xmlns:p14="http://schemas.microsoft.com/office/powerpoint/2010/main" val="2948970664"/>
       </p:ext>
     </p:extLst>
   </p:cSld>
@@ -6012,7 +7604,7 @@
             </a:r>
             <a:r>
               <a:rPr lang="en-US" sz="1200" dirty="0" err="1"/>
-              <a:t>patient_id</a:t>
+              <a:t>bill_id</a:t>
             </a:r>
             <a:endParaRPr lang="en-US" sz="1200" dirty="0"/>
           </a:p>
@@ -6318,6 +7910,58 @@
           </a:p>
         </p:txBody>
       </p:sp>
+      <p:sp>
+        <p:nvSpPr>
+          <p:cNvPr id="8" name="Rectangle 7">
+            <a:extLst>
+              <a:ext uri="{FF2B5EF4-FFF2-40B4-BE49-F238E27FC236}">
+                <a16:creationId xmlns:a16="http://schemas.microsoft.com/office/drawing/2014/main" id="{B9A693C3-875A-59B6-84A9-CA4861A5D765}"/>
+              </a:ext>
+            </a:extLst>
+          </p:cNvPr>
+          <p:cNvSpPr/>
+          <p:nvPr/>
+        </p:nvSpPr>
+        <p:spPr>
+          <a:xfrm>
+            <a:off x="1047172" y="3726101"/>
+            <a:ext cx="957800" cy="584813"/>
+          </a:xfrm>
+          <a:prstGeom prst="rect">
+            <a:avLst/>
+          </a:prstGeom>
+          <a:noFill/>
+          <a:ln>
+            <a:solidFill>
+              <a:srgbClr val="FF0000"/>
+            </a:solidFill>
+          </a:ln>
+        </p:spPr>
+        <p:style>
+          <a:lnRef idx="2">
+            <a:schemeClr val="accent1">
+              <a:shade val="15000"/>
+            </a:schemeClr>
+          </a:lnRef>
+          <a:fillRef idx="1">
+            <a:schemeClr val="accent1"/>
+          </a:fillRef>
+          <a:effectRef idx="0">
+            <a:schemeClr val="accent1"/>
+          </a:effectRef>
+          <a:fontRef idx="minor">
+            <a:schemeClr val="lt1"/>
+          </a:fontRef>
+        </p:style>
+        <p:txBody>
+          <a:bodyPr rtlCol="0" anchor="ctr"/>
+          <a:lstStyle/>
+          <a:p>
+            <a:pPr algn="ctr"/>
+            <a:endParaRPr lang="en-US"/>
+          </a:p>
+        </p:txBody>
+      </p:sp>
     </p:spTree>
     <p:extLst>
       <p:ext uri="{BB962C8B-B14F-4D97-AF65-F5344CB8AC3E}">
@@ -6328,6 +7972,84 @@
   <p:clrMapOvr>
     <a:masterClrMapping/>
   </p:clrMapOvr>
+  <p:timing>
+    <p:tnLst>
+      <p:par>
+        <p:cTn id="1" dur="indefinite" restart="never" nodeType="tmRoot">
+          <p:childTnLst>
+            <p:seq concurrent="1" nextAc="seek">
+              <p:cTn id="2" dur="indefinite" nodeType="mainSeq">
+                <p:childTnLst>
+                  <p:par>
+                    <p:cTn id="3" fill="hold">
+                      <p:stCondLst>
+                        <p:cond delay="indefinite"/>
+                      </p:stCondLst>
+                      <p:childTnLst>
+                        <p:par>
+                          <p:cTn id="4" fill="hold">
+                            <p:stCondLst>
+                              <p:cond delay="0"/>
+                            </p:stCondLst>
+                            <p:childTnLst>
+                              <p:par>
+                                <p:cTn id="5" presetID="1" presetClass="entr" presetSubtype="0" fill="hold" grpId="0" nodeType="clickEffect">
+                                  <p:stCondLst>
+                                    <p:cond delay="0"/>
+                                  </p:stCondLst>
+                                  <p:childTnLst>
+                                    <p:set>
+                                      <p:cBhvr>
+                                        <p:cTn id="6" dur="1" fill="hold">
+                                          <p:stCondLst>
+                                            <p:cond delay="0"/>
+                                          </p:stCondLst>
+                                        </p:cTn>
+                                        <p:tgtEl>
+                                          <p:spTgt spid="8"/>
+                                        </p:tgtEl>
+                                        <p:attrNameLst>
+                                          <p:attrName>style.visibility</p:attrName>
+                                        </p:attrNameLst>
+                                      </p:cBhvr>
+                                      <p:to>
+                                        <p:strVal val="visible"/>
+                                      </p:to>
+                                    </p:set>
+                                  </p:childTnLst>
+                                </p:cTn>
+                              </p:par>
+                            </p:childTnLst>
+                          </p:cTn>
+                        </p:par>
+                      </p:childTnLst>
+                    </p:cTn>
+                  </p:par>
+                </p:childTnLst>
+              </p:cTn>
+              <p:prevCondLst>
+                <p:cond evt="onPrev" delay="0">
+                  <p:tgtEl>
+                    <p:sldTgt/>
+                  </p:tgtEl>
+                </p:cond>
+              </p:prevCondLst>
+              <p:nextCondLst>
+                <p:cond evt="onNext" delay="0">
+                  <p:tgtEl>
+                    <p:sldTgt/>
+                  </p:tgtEl>
+                </p:cond>
+              </p:nextCondLst>
+            </p:seq>
+          </p:childTnLst>
+        </p:cTn>
+      </p:par>
+    </p:tnLst>
+    <p:bldLst>
+      <p:bldP spid="8" grpId="0" animBg="1"/>
+    </p:bldLst>
+  </p:timing>
 </p:sld>
 </file>
 
@@ -6815,11 +8537,17 @@
           <p:cNvGraphicFramePr>
             <a:graphicFrameLocks noGrp="1"/>
           </p:cNvGraphicFramePr>
-          <p:nvPr/>
+          <p:nvPr>
+            <p:extLst>
+              <p:ext uri="{D42A27DB-BD31-4B8C-83A1-F6EECF244321}">
+                <p14:modId xmlns:p14="http://schemas.microsoft.com/office/powerpoint/2010/main" val="2149113396"/>
+              </p:ext>
+            </p:extLst>
+          </p:nvPr>
         </p:nvGraphicFramePr>
         <p:xfrm>
           <a:off x="4048216" y="3645199"/>
-          <a:ext cx="3107186" cy="2296160"/>
+          <a:ext cx="3107186" cy="2936240"/>
         </p:xfrm>
         <a:graphic>
           <a:graphicData uri="http://schemas.openxmlformats.org/drawingml/2006/table">
@@ -6990,14 +8718,23 @@
                     <a:lstStyle/>
                     <a:p>
                       <a:r>
-                        <a:rPr lang="en-US" sz="1200">
+                        <a:rPr lang="en-US" sz="1200" dirty="0">
                           <a:effectLst/>
                         </a:rPr>
-                        <a:t>‘Chinese’,’Indian’,’Chinese’,’India’</a:t>
+                        <a:t>‘Chinese’,’Indian’,’</a:t>
                       </a:r>
-                      <a:endParaRPr lang="en-US" sz="1200" dirty="0">
-                        <a:effectLst/>
-                      </a:endParaRPr>
+                      <a:r>
+                        <a:rPr lang="en-US" sz="1200" dirty="0" err="1">
+                          <a:effectLst/>
+                        </a:rPr>
+                        <a:t>chinese</a:t>
+                      </a:r>
+                      <a:r>
+                        <a:rPr lang="en-US" sz="1200" dirty="0">
+                          <a:effectLst/>
+                        </a:rPr>
+                        <a:t>’,’India’</a:t>
+                      </a:r>
                     </a:p>
                   </a:txBody>
                   <a:tcPr marL="47625" marR="47625" marT="38100" marB="38100" anchor="ctr"/>
@@ -7076,6 +8813,40 @@
                   </a:ext>
                 </a:extLst>
               </a:tr>
+              <a:tr h="370840">
+                <a:tc>
+                  <a:txBody>
+                    <a:bodyPr/>
+                    <a:lstStyle/>
+                    <a:p>
+                      <a:r>
+                        <a:rPr lang="en-US" sz="1200" dirty="0" err="1"/>
+                        <a:t>Resident_status</a:t>
+                      </a:r>
+                      <a:endParaRPr lang="en-US" sz="1200" dirty="0"/>
+                    </a:p>
+                  </a:txBody>
+                  <a:tcPr anchor="ctr"/>
+                </a:tc>
+                <a:tc>
+                  <a:txBody>
+                    <a:bodyPr/>
+                    <a:lstStyle/>
+                    <a:p>
+                      <a:r>
+                        <a:rPr lang="en-US" sz="1200" dirty="0"/>
+                        <a:t>‘Singaporean’, ’PR’, ’Singapore Citizen’, ‘Foreigner’</a:t>
+                      </a:r>
+                    </a:p>
+                  </a:txBody>
+                  <a:tcPr anchor="ctr"/>
+                </a:tc>
+                <a:extLst>
+                  <a:ext uri="{0D108BD9-81ED-4DB2-BD59-A6C34878D82A}">
+                    <a16:rowId xmlns:a16="http://schemas.microsoft.com/office/drawing/2014/main" val="2266260388"/>
+                  </a:ext>
+                </a:extLst>
+              </a:tr>
             </a:tbl>
           </a:graphicData>
         </a:graphic>
@@ -7173,11 +8944,17 @@
           <p:cNvGraphicFramePr>
             <a:graphicFrameLocks noGrp="1"/>
           </p:cNvGraphicFramePr>
-          <p:nvPr/>
+          <p:nvPr>
+            <p:extLst>
+              <p:ext uri="{D42A27DB-BD31-4B8C-83A1-F6EECF244321}">
+                <p14:modId xmlns:p14="http://schemas.microsoft.com/office/powerpoint/2010/main" val="2887531043"/>
+              </p:ext>
+            </p:extLst>
+          </p:nvPr>
         </p:nvGraphicFramePr>
         <p:xfrm>
           <a:off x="7971656" y="3645199"/>
-          <a:ext cx="3107186" cy="2824480"/>
+          <a:ext cx="4055244" cy="2926080"/>
         </p:xfrm>
         <a:graphic>
           <a:graphicData uri="http://schemas.openxmlformats.org/drawingml/2006/table">
@@ -7186,14 +8963,14 @@
                 <a:tableStyleId>{5C22544A-7EE6-4342-B048-85BDC9FD1C3A}</a:tableStyleId>
               </a:tblPr>
               <a:tblGrid>
-                <a:gridCol w="1553593">
+                <a:gridCol w="2027622">
                   <a:extLst>
                     <a:ext uri="{9D8B030D-6E8A-4147-A177-3AD203B41FA5}">
                       <a16:colId xmlns:a16="http://schemas.microsoft.com/office/drawing/2014/main" val="4172915525"/>
                     </a:ext>
                   </a:extLst>
                 </a:gridCol>
-                <a:gridCol w="1553593">
+                <a:gridCol w="2027622">
                   <a:extLst>
                     <a:ext uri="{9D8B030D-6E8A-4147-A177-3AD203B41FA5}">
                       <a16:colId xmlns:a16="http://schemas.microsoft.com/office/drawing/2014/main" val="994542044"/>
@@ -7441,6 +9218,40 @@
                   </a:ext>
                 </a:extLst>
               </a:tr>
+              <a:tr h="370840">
+                <a:tc>
+                  <a:txBody>
+                    <a:bodyPr/>
+                    <a:lstStyle/>
+                    <a:p>
+                      <a:r>
+                        <a:rPr lang="en-US" sz="1200" dirty="0" err="1"/>
+                        <a:t>Resident_status</a:t>
+                      </a:r>
+                      <a:endParaRPr lang="en-US" sz="1200" dirty="0"/>
+                    </a:p>
+                  </a:txBody>
+                  <a:tcPr anchor="ctr"/>
+                </a:tc>
+                <a:tc>
+                  <a:txBody>
+                    <a:bodyPr/>
+                    <a:lstStyle/>
+                    <a:p>
+                      <a:r>
+                        <a:rPr lang="en-US" sz="1200" dirty="0"/>
+                        <a:t>‘Singaporean’, ’PR’, ‘Foreigner’</a:t>
+                      </a:r>
+                    </a:p>
+                  </a:txBody>
+                  <a:tcPr anchor="ctr"/>
+                </a:tc>
+                <a:extLst>
+                  <a:ext uri="{0D108BD9-81ED-4DB2-BD59-A6C34878D82A}">
+                    <a16:rowId xmlns:a16="http://schemas.microsoft.com/office/drawing/2014/main" val="915946957"/>
+                  </a:ext>
+                </a:extLst>
+              </a:tr>
             </a:tbl>
           </a:graphicData>
         </a:graphic>
@@ -7480,7 +9291,7 @@
           <p:cNvPr id="2" name="Title 1">
             <a:extLst>
               <a:ext uri="{FF2B5EF4-FFF2-40B4-BE49-F238E27FC236}">
-                <a16:creationId xmlns:a16="http://schemas.microsoft.com/office/drawing/2014/main" id="{B50C9D22-CAE8-F906-5B0D-933C15FB5A13}"/>
+                <a16:creationId xmlns:a16="http://schemas.microsoft.com/office/drawing/2014/main" id="{F0159EA2-FAE8-4FCD-DE59-6A65B0819E15}"/>
               </a:ext>
             </a:extLst>
           </p:cNvPr>
@@ -7496,7 +9307,10 @@
           <a:bodyPr/>
           <a:lstStyle/>
           <a:p>
-            <a:endParaRPr lang="en-US"/>
+            <a:r>
+              <a:rPr lang="en-US" dirty="0"/>
+              <a:t>Feature calculation</a:t>
+            </a:r>
           </a:p>
         </p:txBody>
       </p:sp>
@@ -7505,7 +9319,7 @@
           <p:cNvPr id="3" name="Content Placeholder 2">
             <a:extLst>
               <a:ext uri="{FF2B5EF4-FFF2-40B4-BE49-F238E27FC236}">
-                <a16:creationId xmlns:a16="http://schemas.microsoft.com/office/drawing/2014/main" id="{A6910625-2222-8120-6052-11B0BF31014B}"/>
+                <a16:creationId xmlns:a16="http://schemas.microsoft.com/office/drawing/2014/main" id="{2F80959D-86C2-A80D-616A-F1515BD1DB77}"/>
               </a:ext>
             </a:extLst>
           </p:cNvPr>
@@ -7518,17 +9332,547 @@
         </p:nvSpPr>
         <p:spPr/>
         <p:txBody>
-          <a:bodyPr/>
+          <a:bodyPr>
+            <a:normAutofit lnSpcReduction="10000"/>
+          </a:bodyPr>
           <a:lstStyle/>
           <a:p>
-            <a:endParaRPr lang="en-US"/>
+            <a:r>
+              <a:rPr lang="en-US" dirty="0"/>
+              <a:t>Several features that could provide value for the analysis (</a:t>
+            </a:r>
+            <a:r>
+              <a:rPr lang="en-US" dirty="0" err="1"/>
+              <a:t>e.g</a:t>
+            </a:r>
+            <a:r>
+              <a:rPr lang="en-US" dirty="0"/>
+              <a:t>, Age, duration of stay etc.) were calculated from the existing data.</a:t>
+            </a:r>
+          </a:p>
+          <a:p>
+            <a:r>
+              <a:rPr lang="en-US" dirty="0"/>
+              <a:t>Age=date of birth-date of admission</a:t>
+            </a:r>
+          </a:p>
+          <a:p>
+            <a:r>
+              <a:rPr lang="en-US" dirty="0"/>
+              <a:t>Duration of stay=date of discharge-date of admission</a:t>
+            </a:r>
+          </a:p>
+          <a:p>
+            <a:r>
+              <a:rPr lang="en-US" dirty="0"/>
+              <a:t>Score difference=</a:t>
+            </a:r>
+            <a:r>
+              <a:rPr lang="en-US" dirty="0" err="1"/>
+              <a:t>CGIS_dis-CGIS_adm</a:t>
+            </a:r>
+            <a:r>
+              <a:rPr lang="en-US" dirty="0"/>
+              <a:t> (Lower is better)</a:t>
+            </a:r>
+          </a:p>
+          <a:p>
+            <a:r>
+              <a:rPr lang="en-US" dirty="0"/>
+              <a:t>Treatment outcome: </a:t>
+            </a:r>
+            <a:r>
+              <a:rPr lang="en-US" dirty="0" err="1"/>
+              <a:t>Score_difference</a:t>
+            </a:r>
+            <a:r>
+              <a:rPr lang="en-US" dirty="0"/>
+              <a:t>&lt;0=Better, </a:t>
+            </a:r>
+            <a:r>
+              <a:rPr lang="en-US" dirty="0" err="1"/>
+              <a:t>Score_difference</a:t>
+            </a:r>
+            <a:r>
+              <a:rPr lang="en-US" dirty="0"/>
+              <a:t>&lt;0&gt;=Worse or Neutral</a:t>
+            </a:r>
+          </a:p>
+          <a:p>
+            <a:pPr lvl="1"/>
+            <a:r>
+              <a:rPr lang="en-US" dirty="0"/>
+              <a:t>Dummy coded as 1 for Better and 0 for Worse or Neutral.</a:t>
+            </a:r>
+          </a:p>
+          <a:p>
+            <a:r>
+              <a:rPr lang="en-US" dirty="0"/>
+              <a:t>Number of concurrent treatments= Sum of the treatment columns</a:t>
+            </a:r>
+          </a:p>
+          <a:p>
+            <a:r>
+              <a:rPr lang="en-US" dirty="0"/>
+              <a:t>Number of concurrent symptoms= Sum of the symptom columns</a:t>
+            </a:r>
           </a:p>
         </p:txBody>
       </p:sp>
     </p:spTree>
     <p:extLst>
       <p:ext uri="{BB962C8B-B14F-4D97-AF65-F5344CB8AC3E}">
-        <p14:creationId xmlns:p14="http://schemas.microsoft.com/office/powerpoint/2010/main" val="988293865"/>
+        <p14:creationId xmlns:p14="http://schemas.microsoft.com/office/powerpoint/2010/main" val="1866208017"/>
+      </p:ext>
+    </p:extLst>
+  </p:cSld>
+  <p:clrMapOvr>
+    <a:masterClrMapping/>
+  </p:clrMapOvr>
+</p:sld>
+</file>
+
+<file path=ppt/slides/slide8.xml><?xml version="1.0" encoding="utf-8"?>
+<p:sld xmlns:a="http://schemas.openxmlformats.org/drawingml/2006/main" xmlns:r="http://schemas.openxmlformats.org/officeDocument/2006/relationships" xmlns:p="http://schemas.openxmlformats.org/presentationml/2006/main">
+  <p:cSld>
+    <p:spTree>
+      <p:nvGrpSpPr>
+        <p:cNvPr id="1" name=""/>
+        <p:cNvGrpSpPr/>
+        <p:nvPr/>
+      </p:nvGrpSpPr>
+      <p:grpSpPr>
+        <a:xfrm>
+          <a:off x="0" y="0"/>
+          <a:ext cx="0" cy="0"/>
+          <a:chOff x="0" y="0"/>
+          <a:chExt cx="0" cy="0"/>
+        </a:xfrm>
+      </p:grpSpPr>
+      <p:sp>
+        <p:nvSpPr>
+          <p:cNvPr id="2" name="Title 1">
+            <a:extLst>
+              <a:ext uri="{FF2B5EF4-FFF2-40B4-BE49-F238E27FC236}">
+                <a16:creationId xmlns:a16="http://schemas.microsoft.com/office/drawing/2014/main" id="{B8CFD8B3-EA26-A2EC-0B64-60027EC88B33}"/>
+              </a:ext>
+            </a:extLst>
+          </p:cNvPr>
+          <p:cNvSpPr>
+            <a:spLocks noGrp="1"/>
+          </p:cNvSpPr>
+          <p:nvPr>
+            <p:ph type="title"/>
+          </p:nvPr>
+        </p:nvSpPr>
+        <p:spPr/>
+        <p:txBody>
+          <a:bodyPr/>
+          <a:lstStyle/>
+          <a:p>
+            <a:r>
+              <a:rPr lang="en-US" dirty="0"/>
+              <a:t>Results (Descriptive)</a:t>
+            </a:r>
+          </a:p>
+        </p:txBody>
+      </p:sp>
+      <p:sp>
+        <p:nvSpPr>
+          <p:cNvPr id="3" name="Content Placeholder 2">
+            <a:extLst>
+              <a:ext uri="{FF2B5EF4-FFF2-40B4-BE49-F238E27FC236}">
+                <a16:creationId xmlns:a16="http://schemas.microsoft.com/office/drawing/2014/main" id="{113B53DB-1366-0DD6-EFAD-16D50433C0DF}"/>
+              </a:ext>
+            </a:extLst>
+          </p:cNvPr>
+          <p:cNvSpPr>
+            <a:spLocks noGrp="1"/>
+          </p:cNvSpPr>
+          <p:nvPr>
+            <p:ph idx="1"/>
+          </p:nvPr>
+        </p:nvSpPr>
+        <p:spPr>
+          <a:xfrm>
+            <a:off x="838200" y="1825625"/>
+            <a:ext cx="7995082" cy="4351338"/>
+          </a:xfrm>
+        </p:spPr>
+        <p:txBody>
+          <a:bodyPr>
+            <a:normAutofit fontScale="92500" lnSpcReduction="10000"/>
+          </a:bodyPr>
+          <a:lstStyle/>
+          <a:p>
+            <a:r>
+              <a:rPr lang="en-US" dirty="0"/>
+              <a:t>Out of ~3700 rows, 2898 were retained after preprocessing</a:t>
+            </a:r>
+          </a:p>
+          <a:p>
+            <a:r>
+              <a:rPr lang="en-US" dirty="0"/>
+              <a:t>Descriptive statistics:</a:t>
+            </a:r>
+          </a:p>
+          <a:p>
+            <a:pPr lvl="1"/>
+            <a:r>
+              <a:rPr lang="en-US" dirty="0"/>
+              <a:t>Race distribution: Chinese=64,Malay=21%,Indian=10% Others=5%.</a:t>
+            </a:r>
+          </a:p>
+          <a:p>
+            <a:pPr lvl="1"/>
+            <a:r>
+              <a:rPr lang="en-US" dirty="0"/>
+              <a:t>Age: Mean=51.97yo, Median=50yo, Max=85, Min=21, SD=14.7165</a:t>
+            </a:r>
+          </a:p>
+          <a:p>
+            <a:pPr lvl="1"/>
+            <a:r>
+              <a:rPr lang="en-US" dirty="0"/>
+              <a:t>Gender: Male=50.17%, Female= 49.82%</a:t>
+            </a:r>
+          </a:p>
+          <a:p>
+            <a:pPr lvl="1"/>
+            <a:r>
+              <a:rPr lang="en-US" dirty="0"/>
+              <a:t>Resident Status: Foreigners=4.76%, PR=15.35%, Singaporean=  79.88%</a:t>
+            </a:r>
+          </a:p>
+          <a:p>
+            <a:r>
+              <a:rPr lang="en-US" dirty="0"/>
+              <a:t>Age may have a bimodal distribution</a:t>
+            </a:r>
+          </a:p>
+          <a:p>
+            <a:pPr lvl="1"/>
+            <a:r>
+              <a:rPr lang="en-US" dirty="0"/>
+              <a:t>There may be a young and old subpopulation.</a:t>
+            </a:r>
+          </a:p>
+        </p:txBody>
+      </p:sp>
+      <p:graphicFrame>
+        <p:nvGraphicFramePr>
+          <p:cNvPr id="5" name="Chart 4">
+            <a:extLst>
+              <a:ext uri="{FF2B5EF4-FFF2-40B4-BE49-F238E27FC236}">
+                <a16:creationId xmlns:a16="http://schemas.microsoft.com/office/drawing/2014/main" id="{FB7D46A1-D805-74F5-7DCE-BE7AB31DB778}"/>
+              </a:ext>
+            </a:extLst>
+          </p:cNvPr>
+          <p:cNvGraphicFramePr>
+            <a:graphicFrameLocks/>
+          </p:cNvGraphicFramePr>
+          <p:nvPr/>
+        </p:nvGraphicFramePr>
+        <p:xfrm>
+          <a:off x="9072562" y="365125"/>
+          <a:ext cx="2281238" cy="2843213"/>
+        </p:xfrm>
+        <a:graphic>
+          <a:graphicData uri="http://schemas.openxmlformats.org/drawingml/2006/chart">
+            <c:chart xmlns:c="http://schemas.openxmlformats.org/drawingml/2006/chart" xmlns:r="http://schemas.openxmlformats.org/officeDocument/2006/relationships" r:id="rId2"/>
+          </a:graphicData>
+        </a:graphic>
+      </p:graphicFrame>
+      <p:sp>
+        <p:nvSpPr>
+          <p:cNvPr id="6" name="Rectangle 2">
+            <a:extLst>
+              <a:ext uri="{FF2B5EF4-FFF2-40B4-BE49-F238E27FC236}">
+                <a16:creationId xmlns:a16="http://schemas.microsoft.com/office/drawing/2014/main" id="{B98FCBFE-69BC-78AB-4853-03EC27C832B4}"/>
+              </a:ext>
+            </a:extLst>
+          </p:cNvPr>
+          <p:cNvSpPr>
+            <a:spLocks noChangeArrowheads="1"/>
+          </p:cNvSpPr>
+          <p:nvPr/>
+        </p:nvSpPr>
+        <p:spPr bwMode="auto">
+          <a:xfrm>
+            <a:off x="0" y="0"/>
+            <a:ext cx="12192000" cy="457200"/>
+          </a:xfrm>
+          <a:prstGeom prst="rect">
+            <a:avLst/>
+          </a:prstGeom>
+          <a:solidFill>
+            <a:srgbClr val="FFFFFF"/>
+          </a:solidFill>
+          <a:ln>
+            <a:noFill/>
+          </a:ln>
+          <a:effectLst/>
+          <a:extLst>
+            <a:ext uri="{91240B29-F687-4F45-9708-019B960494DF}">
+              <a14:hiddenLine xmlns:a14="http://schemas.microsoft.com/office/drawing/2010/main" w="9525">
+                <a:solidFill>
+                  <a:schemeClr val="tx1"/>
+                </a:solidFill>
+                <a:miter lim="800000"/>
+                <a:headEnd/>
+                <a:tailEnd/>
+              </a14:hiddenLine>
+            </a:ext>
+            <a:ext uri="{AF507438-7753-43E0-B8FC-AC1667EBCBE1}">
+              <a14:hiddenEffects xmlns:a14="http://schemas.microsoft.com/office/drawing/2010/main">
+                <a:effectLst>
+                  <a:outerShdw dist="35921" dir="2700000" algn="ctr" rotWithShape="0">
+                    <a:schemeClr val="bg2"/>
+                  </a:outerShdw>
+                </a:effectLst>
+              </a14:hiddenEffects>
+            </a:ext>
+          </a:extLst>
+        </p:spPr>
+        <p:txBody>
+          <a:bodyPr vert="horz" wrap="none" lIns="0" tIns="0" rIns="0" bIns="0" numCol="1" anchor="ctr" anchorCtr="0" compatLnSpc="1">
+            <a:prstTxWarp prst="textNoShape">
+              <a:avLst/>
+            </a:prstTxWarp>
+            <a:spAutoFit/>
+          </a:bodyPr>
+          <a:lstStyle/>
+          <a:p>
+            <a:pPr marL="0" marR="0" lvl="0" indent="0" algn="l" defTabSz="914400" rtl="0" eaLnBrk="0" fontAlgn="base" latinLnBrk="0" hangingPunct="0">
+              <a:lnSpc>
+                <a:spcPct val="100000"/>
+              </a:lnSpc>
+              <a:spcBef>
+                <a:spcPct val="0"/>
+              </a:spcBef>
+              <a:spcAft>
+                <a:spcPct val="0"/>
+              </a:spcAft>
+              <a:buClrTx/>
+              <a:buSzTx/>
+              <a:buFontTx/>
+              <a:buNone/>
+              <a:tabLst/>
+            </a:pPr>
+            <a:r>
+              <a:rPr kumimoji="0" lang="en-US" altLang="en-US" sz="900" b="0" i="0" u="none" strike="noStrike" cap="none" normalizeH="0" baseline="0">
+                <a:ln>
+                  <a:noFill/>
+                </a:ln>
+                <a:solidFill>
+                  <a:srgbClr val="000000"/>
+                </a:solidFill>
+                <a:effectLst/>
+                <a:latin typeface="Lucida Console" panose="020B0609040504020204" pitchFamily="49" charset="0"/>
+              </a:rPr>
+              <a:t>50.17253</a:t>
+            </a:r>
+            <a:r>
+              <a:rPr kumimoji="0" lang="en-US" altLang="en-US" sz="800" b="0" i="0" u="none" strike="noStrike" cap="none" normalizeH="0" baseline="0">
+                <a:ln>
+                  <a:noFill/>
+                </a:ln>
+                <a:solidFill>
+                  <a:schemeClr val="tx1"/>
+                </a:solidFill>
+                <a:effectLst/>
+              </a:rPr>
+              <a:t> </a:t>
+            </a:r>
+            <a:endParaRPr kumimoji="0" lang="en-US" altLang="en-US" sz="1800" b="0" i="0" u="none" strike="noStrike" cap="none" normalizeH="0" baseline="0">
+              <a:ln>
+                <a:noFill/>
+              </a:ln>
+              <a:solidFill>
+                <a:schemeClr val="tx1"/>
+              </a:solidFill>
+              <a:effectLst/>
+              <a:latin typeface="Arial" panose="020B0604020202020204" pitchFamily="34" charset="0"/>
+            </a:endParaRPr>
+          </a:p>
+        </p:txBody>
+      </p:sp>
+      <p:pic>
+        <p:nvPicPr>
+          <p:cNvPr id="9" name="Picture 8">
+            <a:extLst>
+              <a:ext uri="{FF2B5EF4-FFF2-40B4-BE49-F238E27FC236}">
+                <a16:creationId xmlns:a16="http://schemas.microsoft.com/office/drawing/2014/main" id="{5A5AE797-5F55-3169-3ADC-108B45021F19}"/>
+              </a:ext>
+            </a:extLst>
+          </p:cNvPr>
+          <p:cNvPicPr>
+            <a:picLocks noChangeAspect="1"/>
+          </p:cNvPicPr>
+          <p:nvPr/>
+        </p:nvPicPr>
+        <p:blipFill>
+          <a:blip r:embed="rId3"/>
+          <a:stretch>
+            <a:fillRect/>
+          </a:stretch>
+        </p:blipFill>
+        <p:spPr>
+          <a:xfrm>
+            <a:off x="8833282" y="3429000"/>
+            <a:ext cx="3190922" cy="3229252"/>
+          </a:xfrm>
+          <a:prstGeom prst="rect">
+            <a:avLst/>
+          </a:prstGeom>
+        </p:spPr>
+      </p:pic>
+    </p:spTree>
+    <p:extLst>
+      <p:ext uri="{BB962C8B-B14F-4D97-AF65-F5344CB8AC3E}">
+        <p14:creationId xmlns:p14="http://schemas.microsoft.com/office/powerpoint/2010/main" val="2525289196"/>
+      </p:ext>
+    </p:extLst>
+  </p:cSld>
+  <p:clrMapOvr>
+    <a:masterClrMapping/>
+  </p:clrMapOvr>
+</p:sld>
+</file>
+
+<file path=ppt/slides/slide9.xml><?xml version="1.0" encoding="utf-8"?>
+<p:sld xmlns:a="http://schemas.openxmlformats.org/drawingml/2006/main" xmlns:r="http://schemas.openxmlformats.org/officeDocument/2006/relationships" xmlns:p="http://schemas.openxmlformats.org/presentationml/2006/main">
+  <p:cSld>
+    <p:spTree>
+      <p:nvGrpSpPr>
+        <p:cNvPr id="1" name=""/>
+        <p:cNvGrpSpPr/>
+        <p:nvPr/>
+      </p:nvGrpSpPr>
+      <p:grpSpPr>
+        <a:xfrm>
+          <a:off x="0" y="0"/>
+          <a:ext cx="0" cy="0"/>
+          <a:chOff x="0" y="0"/>
+          <a:chExt cx="0" cy="0"/>
+        </a:xfrm>
+      </p:grpSpPr>
+      <p:sp>
+        <p:nvSpPr>
+          <p:cNvPr id="2" name="Title 1">
+            <a:extLst>
+              <a:ext uri="{FF2B5EF4-FFF2-40B4-BE49-F238E27FC236}">
+                <a16:creationId xmlns:a16="http://schemas.microsoft.com/office/drawing/2014/main" id="{6B65CC1F-05DB-4EEB-1BD5-DA5861AD4CCB}"/>
+              </a:ext>
+            </a:extLst>
+          </p:cNvPr>
+          <p:cNvSpPr>
+            <a:spLocks noGrp="1"/>
+          </p:cNvSpPr>
+          <p:nvPr>
+            <p:ph type="title"/>
+          </p:nvPr>
+        </p:nvSpPr>
+        <p:spPr/>
+        <p:txBody>
+          <a:bodyPr/>
+          <a:lstStyle/>
+          <a:p>
+            <a:r>
+              <a:rPr lang="en-US" dirty="0"/>
+              <a:t>Results (Health conditions, Treatments &amp; Symptoms)</a:t>
+            </a:r>
+          </a:p>
+        </p:txBody>
+      </p:sp>
+      <p:sp>
+        <p:nvSpPr>
+          <p:cNvPr id="3" name="Content Placeholder 2">
+            <a:extLst>
+              <a:ext uri="{FF2B5EF4-FFF2-40B4-BE49-F238E27FC236}">
+                <a16:creationId xmlns:a16="http://schemas.microsoft.com/office/drawing/2014/main" id="{F656BA11-7211-16DC-C7A0-7625CF6BE253}"/>
+              </a:ext>
+            </a:extLst>
+          </p:cNvPr>
+          <p:cNvSpPr>
+            <a:spLocks noGrp="1"/>
+          </p:cNvSpPr>
+          <p:nvPr>
+            <p:ph idx="1"/>
+          </p:nvPr>
+        </p:nvSpPr>
+        <p:spPr/>
+        <p:txBody>
+          <a:bodyPr>
+            <a:normAutofit fontScale="92500" lnSpcReduction="20000"/>
+          </a:bodyPr>
+          <a:lstStyle/>
+          <a:p>
+            <a:r>
+              <a:rPr lang="en-US" dirty="0"/>
+              <a:t>Concurrent treatments: 90% are under 3 or more treatments</a:t>
+            </a:r>
+          </a:p>
+          <a:p>
+            <a:r>
+              <a:rPr lang="en-US" dirty="0"/>
+              <a:t>~82% are treated with antidepressants</a:t>
+            </a:r>
+          </a:p>
+          <a:p>
+            <a:r>
+              <a:rPr lang="en-US" dirty="0"/>
+              <a:t>~82% are treated with psychotherapy</a:t>
+            </a:r>
+          </a:p>
+          <a:p>
+            <a:r>
+              <a:rPr lang="en-US" dirty="0"/>
+              <a:t>~75% are treated with other therapies.</a:t>
+            </a:r>
+          </a:p>
+          <a:p>
+            <a:r>
+              <a:rPr lang="en-US" dirty="0"/>
+              <a:t>~58% are treated with anticonvulsants.</a:t>
+            </a:r>
+          </a:p>
+          <a:p>
+            <a:endParaRPr lang="en-US" dirty="0"/>
+          </a:p>
+          <a:p>
+            <a:r>
+              <a:rPr lang="en-US" dirty="0"/>
+              <a:t>Concurrent symptoms: 84% have 3 or more symptoms</a:t>
+            </a:r>
+          </a:p>
+          <a:p>
+            <a:r>
+              <a:rPr lang="en-US" dirty="0"/>
+              <a:t>~72% show symptoms of depression</a:t>
+            </a:r>
+          </a:p>
+          <a:p>
+            <a:r>
+              <a:rPr lang="en-US" dirty="0"/>
+              <a:t>~66% show symptoms of lack of appetite</a:t>
+            </a:r>
+          </a:p>
+          <a:p>
+            <a:r>
+              <a:rPr lang="en-US" dirty="0"/>
+              <a:t>~60% show symptoms of abnormal sleep patterns</a:t>
+            </a:r>
+          </a:p>
+          <a:p>
+            <a:endParaRPr lang="en-US" dirty="0"/>
+          </a:p>
+        </p:txBody>
+      </p:sp>
+    </p:spTree>
+    <p:extLst>
+      <p:ext uri="{BB962C8B-B14F-4D97-AF65-F5344CB8AC3E}">
+        <p14:creationId xmlns:p14="http://schemas.microsoft.com/office/powerpoint/2010/main" val="15180984"/>
       </p:ext>
     </p:extLst>
   </p:cSld>

</xml_diff>